<commit_message>
añadir una explicación sobre diferencia entre inversión y contabilidad
</commit_message>
<xml_diff>
--- a/Gestion-Empresa-Proyectos/esquema_basico_del_funcionamiento_economico_de_una_empresa.pptx
+++ b/Gestion-Empresa-Proyectos/esquema_basico_del_funcionamiento_economico_de_una_empresa.pptx
@@ -7,6 +7,7 @@
   <p:sldIdLst>
     <p:sldId id="256" r:id="rId2"/>
     <p:sldId id="257" r:id="rId3"/>
+    <p:sldId id="258" r:id="rId4"/>
   </p:sldIdLst>
   <p:sldSz cx="12192000" cy="6858000"/>
   <p:notesSz cx="6797675" cy="9928225"/>
@@ -244,7 +245,7 @@
           <a:p>
             <a:fld id="{2F8335AE-28F8-4460-B9C7-85D77893EB64}" type="datetimeFigureOut">
               <a:rPr lang="es-ES_tradnl" smtClean="0"/>
-              <a:t>15/03/2022</a:t>
+              <a:t>31/05/2024</a:t>
             </a:fld>
             <a:endParaRPr lang="es-ES_tradnl"/>
           </a:p>
@@ -414,7 +415,7 @@
           <a:p>
             <a:fld id="{2F8335AE-28F8-4460-B9C7-85D77893EB64}" type="datetimeFigureOut">
               <a:rPr lang="es-ES_tradnl" smtClean="0"/>
-              <a:t>15/03/2022</a:t>
+              <a:t>31/05/2024</a:t>
             </a:fld>
             <a:endParaRPr lang="es-ES_tradnl"/>
           </a:p>
@@ -594,7 +595,7 @@
           <a:p>
             <a:fld id="{2F8335AE-28F8-4460-B9C7-85D77893EB64}" type="datetimeFigureOut">
               <a:rPr lang="es-ES_tradnl" smtClean="0"/>
-              <a:t>15/03/2022</a:t>
+              <a:t>31/05/2024</a:t>
             </a:fld>
             <a:endParaRPr lang="es-ES_tradnl"/>
           </a:p>
@@ -764,7 +765,7 @@
           <a:p>
             <a:fld id="{2F8335AE-28F8-4460-B9C7-85D77893EB64}" type="datetimeFigureOut">
               <a:rPr lang="es-ES_tradnl" smtClean="0"/>
-              <a:t>15/03/2022</a:t>
+              <a:t>31/05/2024</a:t>
             </a:fld>
             <a:endParaRPr lang="es-ES_tradnl"/>
           </a:p>
@@ -1010,7 +1011,7 @@
           <a:p>
             <a:fld id="{2F8335AE-28F8-4460-B9C7-85D77893EB64}" type="datetimeFigureOut">
               <a:rPr lang="es-ES_tradnl" smtClean="0"/>
-              <a:t>15/03/2022</a:t>
+              <a:t>31/05/2024</a:t>
             </a:fld>
             <a:endParaRPr lang="es-ES_tradnl"/>
           </a:p>
@@ -1242,7 +1243,7 @@
           <a:p>
             <a:fld id="{2F8335AE-28F8-4460-B9C7-85D77893EB64}" type="datetimeFigureOut">
               <a:rPr lang="es-ES_tradnl" smtClean="0"/>
-              <a:t>15/03/2022</a:t>
+              <a:t>31/05/2024</a:t>
             </a:fld>
             <a:endParaRPr lang="es-ES_tradnl"/>
           </a:p>
@@ -1609,7 +1610,7 @@
           <a:p>
             <a:fld id="{2F8335AE-28F8-4460-B9C7-85D77893EB64}" type="datetimeFigureOut">
               <a:rPr lang="es-ES_tradnl" smtClean="0"/>
-              <a:t>15/03/2022</a:t>
+              <a:t>31/05/2024</a:t>
             </a:fld>
             <a:endParaRPr lang="es-ES_tradnl"/>
           </a:p>
@@ -1727,7 +1728,7 @@
           <a:p>
             <a:fld id="{2F8335AE-28F8-4460-B9C7-85D77893EB64}" type="datetimeFigureOut">
               <a:rPr lang="es-ES_tradnl" smtClean="0"/>
-              <a:t>15/03/2022</a:t>
+              <a:t>31/05/2024</a:t>
             </a:fld>
             <a:endParaRPr lang="es-ES_tradnl"/>
           </a:p>
@@ -1822,7 +1823,7 @@
           <a:p>
             <a:fld id="{2F8335AE-28F8-4460-B9C7-85D77893EB64}" type="datetimeFigureOut">
               <a:rPr lang="es-ES_tradnl" smtClean="0"/>
-              <a:t>15/03/2022</a:t>
+              <a:t>31/05/2024</a:t>
             </a:fld>
             <a:endParaRPr lang="es-ES_tradnl"/>
           </a:p>
@@ -2099,7 +2100,7 @@
           <a:p>
             <a:fld id="{2F8335AE-28F8-4460-B9C7-85D77893EB64}" type="datetimeFigureOut">
               <a:rPr lang="es-ES_tradnl" smtClean="0"/>
-              <a:t>15/03/2022</a:t>
+              <a:t>31/05/2024</a:t>
             </a:fld>
             <a:endParaRPr lang="es-ES_tradnl"/>
           </a:p>
@@ -2352,7 +2353,7 @@
           <a:p>
             <a:fld id="{2F8335AE-28F8-4460-B9C7-85D77893EB64}" type="datetimeFigureOut">
               <a:rPr lang="es-ES_tradnl" smtClean="0"/>
-              <a:t>15/03/2022</a:t>
+              <a:t>31/05/2024</a:t>
             </a:fld>
             <a:endParaRPr lang="es-ES_tradnl"/>
           </a:p>
@@ -2565,7 +2566,7 @@
           <a:p>
             <a:fld id="{2F8335AE-28F8-4460-B9C7-85D77893EB64}" type="datetimeFigureOut">
               <a:rPr lang="es-ES_tradnl" smtClean="0"/>
-              <a:t>15/03/2022</a:t>
+              <a:t>31/05/2024</a:t>
             </a:fld>
             <a:endParaRPr lang="es-ES_tradnl"/>
           </a:p>
@@ -7141,6 +7142,455 @@
 </p:sld>
 </file>
 
+<file path=ppt/slides/slide3.xml><?xml version="1.0" encoding="utf-8"?>
+<p:sld xmlns:a="http://schemas.openxmlformats.org/drawingml/2006/main" xmlns:r="http://schemas.openxmlformats.org/officeDocument/2006/relationships" xmlns:p="http://schemas.openxmlformats.org/presentationml/2006/main">
+  <p:cSld>
+    <p:spTree>
+      <p:nvGrpSpPr>
+        <p:cNvPr id="1" name=""/>
+        <p:cNvGrpSpPr/>
+        <p:nvPr/>
+      </p:nvGrpSpPr>
+      <p:grpSpPr>
+        <a:xfrm>
+          <a:off x="0" y="0"/>
+          <a:ext cx="0" cy="0"/>
+          <a:chOff x="0" y="0"/>
+          <a:chExt cx="0" cy="0"/>
+        </a:xfrm>
+      </p:grpSpPr>
+      <p:sp>
+        <p:nvSpPr>
+          <p:cNvPr id="2" name="Título 1"/>
+          <p:cNvSpPr>
+            <a:spLocks noGrp="1"/>
+          </p:cNvSpPr>
+          <p:nvPr>
+            <p:ph type="title"/>
+          </p:nvPr>
+        </p:nvSpPr>
+        <p:spPr/>
+        <p:txBody>
+          <a:bodyPr>
+            <a:noAutofit/>
+          </a:bodyPr>
+          <a:lstStyle/>
+          <a:p>
+            <a:pPr algn="ctr"/>
+            <a:r>
+              <a:rPr lang="es-ES" sz="3200" dirty="0" smtClean="0"/>
+              <a:t>Diferencia </a:t>
+            </a:r>
+            <a:r>
+              <a:rPr lang="es-ES" sz="3200" dirty="0"/>
+              <a:t>entre </a:t>
+            </a:r>
+            <a:r>
+              <a:rPr lang="es-ES" sz="3200" dirty="0"/>
+              <a:t>FINANZAS</a:t>
+            </a:r>
+            <a:r>
+              <a:rPr lang="es-ES" sz="3200" dirty="0"/>
+              <a:t> y CONTABILIDAD</a:t>
+            </a:r>
+            <a:endParaRPr lang="es-ES" sz="3200" dirty="0"/>
+          </a:p>
+        </p:txBody>
+      </p:sp>
+      <p:sp>
+        <p:nvSpPr>
+          <p:cNvPr id="3" name="Marcador de contenido 2"/>
+          <p:cNvSpPr>
+            <a:spLocks noGrp="1"/>
+          </p:cNvSpPr>
+          <p:nvPr>
+            <p:ph idx="1"/>
+          </p:nvPr>
+        </p:nvSpPr>
+        <p:spPr>
+          <a:xfrm>
+            <a:off x="1772194" y="1690688"/>
+            <a:ext cx="8752113" cy="2441575"/>
+          </a:xfrm>
+        </p:spPr>
+        <p:txBody>
+          <a:bodyPr>
+            <a:normAutofit fontScale="25000" lnSpcReduction="20000"/>
+          </a:bodyPr>
+          <a:lstStyle/>
+          <a:p>
+            <a:pPr marL="180000" indent="-180000">
+              <a:lnSpc>
+                <a:spcPct val="170000"/>
+              </a:lnSpc>
+            </a:pPr>
+            <a:r>
+              <a:rPr lang="es-ES" sz="7200" dirty="0">
+                <a:latin typeface="Arial" panose="020B0604020202020204" pitchFamily="34" charset="0"/>
+                <a:cs typeface="Arial" panose="020B0604020202020204" pitchFamily="34" charset="0"/>
+              </a:rPr>
+              <a:t>Finanzas</a:t>
+            </a:r>
+            <a:r>
+              <a:rPr lang="es-ES" sz="7200" dirty="0" smtClean="0">
+                <a:latin typeface="Arial" panose="020B0604020202020204" pitchFamily="34" charset="0"/>
+                <a:cs typeface="Arial" panose="020B0604020202020204" pitchFamily="34" charset="0"/>
+              </a:rPr>
+              <a:t>:</a:t>
+            </a:r>
+            <a:r>
+              <a:rPr lang="es-ES" sz="4500" dirty="0" smtClean="0">
+                <a:latin typeface="Times New Roman" panose="02020603050405020304" pitchFamily="18" charset="0"/>
+                <a:cs typeface="Times New Roman" panose="02020603050405020304" pitchFamily="18" charset="0"/>
+              </a:rPr>
+              <a:t/>
+            </a:r>
+            <a:br>
+              <a:rPr lang="es-ES" sz="4500" dirty="0" smtClean="0">
+                <a:latin typeface="Times New Roman" panose="02020603050405020304" pitchFamily="18" charset="0"/>
+                <a:cs typeface="Times New Roman" panose="02020603050405020304" pitchFamily="18" charset="0"/>
+              </a:rPr>
+            </a:br>
+            <a:r>
+              <a:rPr lang="es-ES" sz="5600" dirty="0" smtClean="0">
+                <a:latin typeface="Times New Roman" panose="02020603050405020304" pitchFamily="18" charset="0"/>
+                <a:cs typeface="Times New Roman" panose="02020603050405020304" pitchFamily="18" charset="0"/>
+              </a:rPr>
+              <a:t>Realización </a:t>
+            </a:r>
+            <a:r>
+              <a:rPr lang="es-ES" sz="5600" dirty="0">
+                <a:latin typeface="Times New Roman" panose="02020603050405020304" pitchFamily="18" charset="0"/>
+                <a:cs typeface="Times New Roman" panose="02020603050405020304" pitchFamily="18" charset="0"/>
+              </a:rPr>
+              <a:t>de los movimientos de dinero, según este se mueve en la realidad.</a:t>
+            </a:r>
+          </a:p>
+          <a:p>
+            <a:endParaRPr lang="es-ES" sz="4500" dirty="0">
+              <a:latin typeface="Times New Roman" panose="02020603050405020304" pitchFamily="18" charset="0"/>
+              <a:cs typeface="Times New Roman" panose="02020603050405020304" pitchFamily="18" charset="0"/>
+            </a:endParaRPr>
+          </a:p>
+          <a:p>
+            <a:pPr marL="180000" indent="-180000">
+              <a:lnSpc>
+                <a:spcPct val="170000"/>
+              </a:lnSpc>
+            </a:pPr>
+            <a:r>
+              <a:rPr lang="es-ES" sz="7200" dirty="0">
+                <a:latin typeface="Arial" panose="020B0604020202020204" pitchFamily="34" charset="0"/>
+                <a:cs typeface="Arial" panose="020B0604020202020204" pitchFamily="34" charset="0"/>
+              </a:rPr>
+              <a:t>Contabilidad: </a:t>
+            </a:r>
+            <a:r>
+              <a:rPr lang="es-ES" sz="4500" dirty="0" smtClean="0">
+                <a:latin typeface="Times New Roman" panose="02020603050405020304" pitchFamily="18" charset="0"/>
+                <a:cs typeface="Times New Roman" panose="02020603050405020304" pitchFamily="18" charset="0"/>
+              </a:rPr>
+              <a:t/>
+            </a:r>
+            <a:br>
+              <a:rPr lang="es-ES" sz="4500" dirty="0" smtClean="0">
+                <a:latin typeface="Times New Roman" panose="02020603050405020304" pitchFamily="18" charset="0"/>
+                <a:cs typeface="Times New Roman" panose="02020603050405020304" pitchFamily="18" charset="0"/>
+              </a:rPr>
+            </a:br>
+            <a:r>
+              <a:rPr lang="es-ES" sz="5600" dirty="0" smtClean="0">
+                <a:latin typeface="Times New Roman" panose="02020603050405020304" pitchFamily="18" charset="0"/>
+                <a:cs typeface="Times New Roman" panose="02020603050405020304" pitchFamily="18" charset="0"/>
+              </a:rPr>
+              <a:t>Registro </a:t>
+            </a:r>
+            <a:r>
+              <a:rPr lang="es-ES" sz="5600" dirty="0">
+                <a:latin typeface="Times New Roman" panose="02020603050405020304" pitchFamily="18" charset="0"/>
+                <a:cs typeface="Times New Roman" panose="02020603050405020304" pitchFamily="18" charset="0"/>
+              </a:rPr>
+              <a:t>legal de los movimientos de dinero, siguiendo reglas preestablecidas, iguales para todos, </a:t>
+            </a:r>
+            <a:r>
+              <a:rPr lang="es-ES" sz="5600" dirty="0" smtClean="0">
+                <a:latin typeface="Times New Roman" panose="02020603050405020304" pitchFamily="18" charset="0"/>
+                <a:cs typeface="Times New Roman" panose="02020603050405020304" pitchFamily="18" charset="0"/>
+              </a:rPr>
+              <a:t/>
+            </a:r>
+            <a:br>
+              <a:rPr lang="es-ES" sz="5600" dirty="0" smtClean="0">
+                <a:latin typeface="Times New Roman" panose="02020603050405020304" pitchFamily="18" charset="0"/>
+                <a:cs typeface="Times New Roman" panose="02020603050405020304" pitchFamily="18" charset="0"/>
+              </a:rPr>
+            </a:br>
+            <a:r>
+              <a:rPr lang="es-ES" sz="5600" dirty="0" smtClean="0">
+                <a:latin typeface="Times New Roman" panose="02020603050405020304" pitchFamily="18" charset="0"/>
+                <a:cs typeface="Times New Roman" panose="02020603050405020304" pitchFamily="18" charset="0"/>
+              </a:rPr>
+              <a:t>para </a:t>
+            </a:r>
+            <a:r>
+              <a:rPr lang="es-ES" sz="5600" dirty="0">
+                <a:latin typeface="Times New Roman" panose="02020603050405020304" pitchFamily="18" charset="0"/>
+                <a:cs typeface="Times New Roman" panose="02020603050405020304" pitchFamily="18" charset="0"/>
+              </a:rPr>
+              <a:t>calcular, a posteriori, repartos legales tales como los impuestos, los dividendos, la valoración de la empresa,...</a:t>
+            </a:r>
+          </a:p>
+          <a:p>
+            <a:endParaRPr lang="es-ES" dirty="0"/>
+          </a:p>
+        </p:txBody>
+      </p:sp>
+      <p:cxnSp>
+        <p:nvCxnSpPr>
+          <p:cNvPr id="5" name="Conector recto 4"/>
+          <p:cNvCxnSpPr/>
+          <p:nvPr/>
+        </p:nvCxnSpPr>
+        <p:spPr>
+          <a:xfrm flipV="1">
+            <a:off x="2124891" y="1349829"/>
+            <a:ext cx="8046720" cy="43542"/>
+          </a:xfrm>
+          <a:prstGeom prst="line">
+            <a:avLst/>
+          </a:prstGeom>
+        </p:spPr>
+        <p:style>
+          <a:lnRef idx="1">
+            <a:schemeClr val="accent1"/>
+          </a:lnRef>
+          <a:fillRef idx="0">
+            <a:schemeClr val="accent1"/>
+          </a:fillRef>
+          <a:effectRef idx="0">
+            <a:schemeClr val="accent1"/>
+          </a:effectRef>
+          <a:fontRef idx="minor">
+            <a:schemeClr val="tx1"/>
+          </a:fontRef>
+        </p:style>
+      </p:cxnSp>
+      <p:sp>
+        <p:nvSpPr>
+          <p:cNvPr id="7" name="CuadroTexto 6"/>
+          <p:cNvSpPr txBox="1"/>
+          <p:nvPr/>
+        </p:nvSpPr>
+        <p:spPr>
+          <a:xfrm>
+            <a:off x="838200" y="4267200"/>
+            <a:ext cx="10515600" cy="2616101"/>
+          </a:xfrm>
+          <a:prstGeom prst="rect">
+            <a:avLst/>
+          </a:prstGeom>
+          <a:noFill/>
+        </p:spPr>
+        <p:txBody>
+          <a:bodyPr wrap="square" rtlCol="0">
+            <a:spAutoFit/>
+          </a:bodyPr>
+          <a:lstStyle/>
+          <a:p>
+            <a:r>
+              <a:rPr lang="es-ES" sz="1200" dirty="0" smtClean="0">
+                <a:latin typeface="Times New Roman" panose="02020603050405020304" pitchFamily="18" charset="0"/>
+                <a:cs typeface="Times New Roman" panose="02020603050405020304" pitchFamily="18" charset="0"/>
+              </a:rPr>
+              <a:t>Por </a:t>
+            </a:r>
+            <a:r>
+              <a:rPr lang="es-ES" sz="1200" dirty="0">
+                <a:latin typeface="Times New Roman" panose="02020603050405020304" pitchFamily="18" charset="0"/>
+                <a:cs typeface="Times New Roman" panose="02020603050405020304" pitchFamily="18" charset="0"/>
+              </a:rPr>
+              <a:t>ejemplo:</a:t>
+            </a:r>
+          </a:p>
+          <a:p>
+            <a:endParaRPr lang="es-ES" sz="1200" dirty="0">
+              <a:latin typeface="Times New Roman" panose="02020603050405020304" pitchFamily="18" charset="0"/>
+              <a:cs typeface="Times New Roman" panose="02020603050405020304" pitchFamily="18" charset="0"/>
+            </a:endParaRPr>
+          </a:p>
+          <a:p>
+            <a:pPr marL="171450" indent="-171450">
+              <a:spcBef>
+                <a:spcPts val="600"/>
+              </a:spcBef>
+              <a:buFont typeface="Arial" panose="020B0604020202020204" pitchFamily="34" charset="0"/>
+              <a:buChar char="•"/>
+            </a:pPr>
+            <a:r>
+              <a:rPr lang="es-ES" sz="1200" dirty="0" smtClean="0">
+                <a:latin typeface="Times New Roman" panose="02020603050405020304" pitchFamily="18" charset="0"/>
+                <a:cs typeface="Times New Roman" panose="02020603050405020304" pitchFamily="18" charset="0"/>
+              </a:rPr>
+              <a:t>Desde </a:t>
+            </a:r>
+            <a:r>
+              <a:rPr lang="es-ES" sz="1200" dirty="0">
+                <a:latin typeface="Times New Roman" panose="02020603050405020304" pitchFamily="18" charset="0"/>
+                <a:cs typeface="Times New Roman" panose="02020603050405020304" pitchFamily="18" charset="0"/>
+              </a:rPr>
+              <a:t>el punto de vista financiero, una inversión se paga en su totalidad en el momento en que se realiza.</a:t>
+            </a:r>
+          </a:p>
+          <a:p>
+            <a:pPr marL="171450" indent="-171450">
+              <a:spcBef>
+                <a:spcPts val="600"/>
+              </a:spcBef>
+              <a:buFont typeface="Arial" panose="020B0604020202020204" pitchFamily="34" charset="0"/>
+              <a:buChar char="•"/>
+            </a:pPr>
+            <a:r>
+              <a:rPr lang="es-ES" sz="1200" dirty="0" smtClean="0">
+                <a:latin typeface="Times New Roman" panose="02020603050405020304" pitchFamily="18" charset="0"/>
+                <a:cs typeface="Times New Roman" panose="02020603050405020304" pitchFamily="18" charset="0"/>
+              </a:rPr>
+              <a:t>Desde </a:t>
+            </a:r>
+            <a:r>
+              <a:rPr lang="es-ES" sz="1200" dirty="0">
+                <a:latin typeface="Times New Roman" panose="02020603050405020304" pitchFamily="18" charset="0"/>
+                <a:cs typeface="Times New Roman" panose="02020603050405020304" pitchFamily="18" charset="0"/>
+              </a:rPr>
+              <a:t>el punto de vista contable, esa inversión se "guarda" en una cuenta (sin afectar a beneficios) y se va amortizando progresivamente (reduciendo beneficios) a lo largo de varios años.</a:t>
+            </a:r>
+          </a:p>
+          <a:p>
+            <a:endParaRPr lang="es-ES" sz="1200" dirty="0">
+              <a:latin typeface="Times New Roman" panose="02020603050405020304" pitchFamily="18" charset="0"/>
+              <a:cs typeface="Times New Roman" panose="02020603050405020304" pitchFamily="18" charset="0"/>
+            </a:endParaRPr>
+          </a:p>
+          <a:p>
+            <a:pPr marL="171450" indent="-171450">
+              <a:spcBef>
+                <a:spcPts val="600"/>
+              </a:spcBef>
+              <a:buFont typeface="Arial" panose="020B0604020202020204" pitchFamily="34" charset="0"/>
+              <a:buChar char="•"/>
+            </a:pPr>
+            <a:r>
+              <a:rPr lang="es-ES" sz="1200" dirty="0" smtClean="0">
+                <a:latin typeface="Times New Roman" panose="02020603050405020304" pitchFamily="18" charset="0"/>
+                <a:cs typeface="Times New Roman" panose="02020603050405020304" pitchFamily="18" charset="0"/>
+              </a:rPr>
+              <a:t>Desde </a:t>
+            </a:r>
+            <a:r>
+              <a:rPr lang="es-ES" sz="1200" dirty="0">
+                <a:latin typeface="Times New Roman" panose="02020603050405020304" pitchFamily="18" charset="0"/>
+                <a:cs typeface="Times New Roman" panose="02020603050405020304" pitchFamily="18" charset="0"/>
+              </a:rPr>
+              <a:t>el punto de vista financiero, un resultado de pérdidas se produce en el día, mes o año en que </a:t>
+            </a:r>
+            <a:r>
+              <a:rPr lang="es-ES" sz="1200">
+                <a:latin typeface="Times New Roman" panose="02020603050405020304" pitchFamily="18" charset="0"/>
+                <a:cs typeface="Times New Roman" panose="02020603050405020304" pitchFamily="18" charset="0"/>
+              </a:rPr>
+              <a:t>se </a:t>
+            </a:r>
+            <a:r>
+              <a:rPr lang="es-ES" sz="1200" smtClean="0">
+                <a:latin typeface="Times New Roman" panose="02020603050405020304" pitchFamily="18" charset="0"/>
+                <a:cs typeface="Times New Roman" panose="02020603050405020304" pitchFamily="18" charset="0"/>
+              </a:rPr>
+              <a:t>calcula </a:t>
+            </a:r>
+            <a:r>
+              <a:rPr lang="es-ES" sz="1200" dirty="0">
+                <a:latin typeface="Times New Roman" panose="02020603050405020304" pitchFamily="18" charset="0"/>
+                <a:cs typeface="Times New Roman" panose="02020603050405020304" pitchFamily="18" charset="0"/>
+              </a:rPr>
+              <a:t>(ingresos - </a:t>
+            </a:r>
+            <a:r>
+              <a:rPr lang="es-ES" sz="1200" dirty="0" err="1">
+                <a:latin typeface="Times New Roman" panose="02020603050405020304" pitchFamily="18" charset="0"/>
+                <a:cs typeface="Times New Roman" panose="02020603050405020304" pitchFamily="18" charset="0"/>
+              </a:rPr>
+              <a:t>gastos|inversiones</a:t>
+            </a:r>
+            <a:r>
+              <a:rPr lang="es-ES" sz="1200" dirty="0">
+                <a:latin typeface="Times New Roman" panose="02020603050405020304" pitchFamily="18" charset="0"/>
+                <a:cs typeface="Times New Roman" panose="02020603050405020304" pitchFamily="18" charset="0"/>
+              </a:rPr>
+              <a:t>).</a:t>
+            </a:r>
+          </a:p>
+          <a:p>
+            <a:pPr marL="171450" indent="-171450">
+              <a:spcBef>
+                <a:spcPts val="600"/>
+              </a:spcBef>
+              <a:buFont typeface="Arial" panose="020B0604020202020204" pitchFamily="34" charset="0"/>
+              <a:buChar char="•"/>
+            </a:pPr>
+            <a:r>
+              <a:rPr lang="es-ES" sz="1200" dirty="0" smtClean="0">
+                <a:latin typeface="Times New Roman" panose="02020603050405020304" pitchFamily="18" charset="0"/>
+                <a:cs typeface="Times New Roman" panose="02020603050405020304" pitchFamily="18" charset="0"/>
+              </a:rPr>
+              <a:t>Desde </a:t>
+            </a:r>
+            <a:r>
+              <a:rPr lang="es-ES" sz="1200" dirty="0">
+                <a:latin typeface="Times New Roman" panose="02020603050405020304" pitchFamily="18" charset="0"/>
+                <a:cs typeface="Times New Roman" panose="02020603050405020304" pitchFamily="18" charset="0"/>
+              </a:rPr>
+              <a:t>el punto de vista contable, esas pérdidas se "guardan" en una cuenta desde la que se pueden compensar ganancias en los años venideros para pagar menos impuestos en esos otros años.</a:t>
+            </a:r>
+          </a:p>
+          <a:p>
+            <a:endParaRPr lang="es-ES" sz="1200" dirty="0">
+              <a:latin typeface="Times New Roman" panose="02020603050405020304" pitchFamily="18" charset="0"/>
+              <a:cs typeface="Times New Roman" panose="02020603050405020304" pitchFamily="18" charset="0"/>
+            </a:endParaRPr>
+          </a:p>
+          <a:p>
+            <a:endParaRPr lang="es-ES" sz="1200" dirty="0">
+              <a:latin typeface="Times New Roman" panose="02020603050405020304" pitchFamily="18" charset="0"/>
+              <a:cs typeface="Times New Roman" panose="02020603050405020304" pitchFamily="18" charset="0"/>
+            </a:endParaRPr>
+          </a:p>
+          <a:p>
+            <a:endParaRPr lang="es-ES" sz="1200" dirty="0">
+              <a:latin typeface="Times New Roman" panose="02020603050405020304" pitchFamily="18" charset="0"/>
+              <a:cs typeface="Times New Roman" panose="02020603050405020304" pitchFamily="18" charset="0"/>
+            </a:endParaRPr>
+          </a:p>
+        </p:txBody>
+      </p:sp>
+    </p:spTree>
+    <p:extLst>
+      <p:ext uri="{BB962C8B-B14F-4D97-AF65-F5344CB8AC3E}">
+        <p14:creationId xmlns:p14="http://schemas.microsoft.com/office/powerpoint/2010/main" val="2352049794"/>
+      </p:ext>
+    </p:extLst>
+  </p:cSld>
+  <p:clrMapOvr>
+    <a:masterClrMapping/>
+  </p:clrMapOvr>
+  <p:timing>
+    <p:tnLst>
+      <p:par>
+        <p:cTn id="1" dur="indefinite" restart="never" nodeType="tmRoot"/>
+      </p:par>
+    </p:tnLst>
+  </p:timing>
+</p:sld>
+</file>
+
 <file path=ppt/theme/theme1.xml><?xml version="1.0" encoding="utf-8"?>
 <a:theme xmlns:a="http://schemas.openxmlformats.org/drawingml/2006/main" name="Tema de Office">
   <a:themeElements>

</xml_diff>